<commit_message>
Added Contribution/ Security Page
</commit_message>
<xml_diff>
--- a/SetStats_finalScreenCast.pptx
+++ b/SetStats_finalScreenCast.pptx
@@ -8,9 +8,10 @@
     <p:sldId id="256" r:id="rId2"/>
     <p:sldId id="257" r:id="rId3"/>
     <p:sldId id="258" r:id="rId4"/>
-    <p:sldId id="259" r:id="rId5"/>
-    <p:sldId id="260" r:id="rId6"/>
-    <p:sldId id="261" r:id="rId7"/>
+    <p:sldId id="262" r:id="rId5"/>
+    <p:sldId id="259" r:id="rId6"/>
+    <p:sldId id="260" r:id="rId7"/>
+    <p:sldId id="261" r:id="rId8"/>
   </p:sldIdLst>
   <p:sldSz cx="12192000" cy="6858000"/>
   <p:notesSz cx="6858000" cy="9144000"/>
@@ -6313,10 +6314,44 @@
             </a:r>
           </a:p>
           <a:p>
-            <a:pPr marL="0" indent="0">
-              <a:buNone/>
-            </a:pPr>
-            <a:endParaRPr lang="en-IE" dirty="0"/>
+            <a:r>
+              <a:rPr lang="en-IE" sz="1200" dirty="0"/>
+              <a:t>Designed Website</a:t>
+            </a:r>
+          </a:p>
+          <a:p>
+            <a:r>
+              <a:rPr lang="en-IE" sz="1200" dirty="0"/>
+              <a:t>Connected website to database</a:t>
+            </a:r>
+          </a:p>
+          <a:p>
+            <a:r>
+              <a:rPr lang="en-IE" sz="1200" dirty="0"/>
+              <a:t>Connected website to </a:t>
+            </a:r>
+            <a:r>
+              <a:rPr lang="en-IE" sz="1200" dirty="0" err="1"/>
+              <a:t>pubnub</a:t>
+            </a:r>
+            <a:endParaRPr lang="en-IE" sz="1200" dirty="0"/>
+          </a:p>
+          <a:p>
+            <a:r>
+              <a:rPr lang="en-IE" sz="1200" dirty="0"/>
+              <a:t>Created Login/ Register system</a:t>
+            </a:r>
+          </a:p>
+          <a:p>
+            <a:r>
+              <a:rPr lang="en-IE" sz="1200" dirty="0"/>
+              <a:t>Created </a:t>
+            </a:r>
+            <a:r>
+              <a:rPr lang="en-IE" sz="1200"/>
+              <a:t>Graphs </a:t>
+            </a:r>
+            <a:endParaRPr lang="en-IE" sz="1200" dirty="0"/>
           </a:p>
           <a:p>
             <a:pPr marL="0" indent="0">
@@ -6810,7 +6845,7 @@
           <p:cNvPr id="2" name="Title 1">
             <a:extLst>
               <a:ext uri="{FF2B5EF4-FFF2-40B4-BE49-F238E27FC236}">
-                <a16:creationId xmlns:a16="http://schemas.microsoft.com/office/drawing/2014/main" id="{95AE87BB-59C3-4A85-ACE0-D5ABC3E2BA2A}"/>
+                <a16:creationId xmlns:a16="http://schemas.microsoft.com/office/drawing/2014/main" id="{95D0CD23-829D-4077-B0DA-A30936437F39}"/>
               </a:ext>
             </a:extLst>
           </p:cNvPr>
@@ -6826,10 +6861,9 @@
           <a:bodyPr/>
           <a:lstStyle/>
           <a:p>
-            <a:pPr algn="ctr"/>
-            <a:r>
-              <a:rPr lang="en-IE" b="1" dirty="0"/>
-              <a:t>Known Issues</a:t>
+            <a:r>
+              <a:rPr lang="en-IE" dirty="0"/>
+              <a:t>Security</a:t>
             </a:r>
           </a:p>
         </p:txBody>
@@ -6839,7 +6873,7 @@
           <p:cNvPr id="3" name="Content Placeholder 2">
             <a:extLst>
               <a:ext uri="{FF2B5EF4-FFF2-40B4-BE49-F238E27FC236}">
-                <a16:creationId xmlns:a16="http://schemas.microsoft.com/office/drawing/2014/main" id="{6B37D7EF-5033-4666-858D-E4841CABF5D6}"/>
+                <a16:creationId xmlns:a16="http://schemas.microsoft.com/office/drawing/2014/main" id="{633F522D-147F-4339-A4D9-27296AAD8EA4}"/>
               </a:ext>
             </a:extLst>
           </p:cNvPr>
@@ -6857,20 +6891,46 @@
           <a:p>
             <a:r>
               <a:rPr lang="en-IE" dirty="0"/>
-              <a:t>Graph does not display the way we want it to (pubnub graph)</a:t>
+              <a:t>https using Cloudflare.</a:t>
             </a:r>
           </a:p>
           <a:p>
             <a:r>
               <a:rPr lang="en-IE" dirty="0"/>
-              <a:t>Website needs apache2 restart every few hours or it breaks and you cant login.</a:t>
-            </a:r>
-          </a:p>
-          <a:p>
-            <a:endParaRPr lang="en-IE" dirty="0"/>
-          </a:p>
-          <a:p>
-            <a:endParaRPr lang="en-IE" dirty="0"/>
+              <a:t>We use Hashing and salting to protect passwords of users accounts</a:t>
+            </a:r>
+          </a:p>
+          <a:p>
+            <a:r>
+              <a:rPr lang="en-IE" dirty="0"/>
+              <a:t>Auth key for putty to instance so only people with this private key can </a:t>
+            </a:r>
+            <a:r>
+              <a:rPr lang="en-IE" dirty="0" err="1"/>
+              <a:t>ssh</a:t>
+            </a:r>
+            <a:r>
+              <a:rPr lang="en-IE" dirty="0"/>
+              <a:t> into the AWS instance.</a:t>
+            </a:r>
+          </a:p>
+          <a:p>
+            <a:r>
+              <a:rPr lang="en-IE" dirty="0" err="1"/>
+              <a:t>Mysql</a:t>
+            </a:r>
+            <a:r>
+              <a:rPr lang="en-IE" dirty="0"/>
+              <a:t> root password so only people with this password, can log into and use </a:t>
+            </a:r>
+            <a:r>
+              <a:rPr lang="en-IE" dirty="0" err="1"/>
+              <a:t>Mysql</a:t>
+            </a:r>
+            <a:r>
+              <a:rPr lang="en-IE" dirty="0"/>
+              <a:t> on the instance.</a:t>
+            </a:r>
           </a:p>
           <a:p>
             <a:endParaRPr lang="en-IE" dirty="0"/>
@@ -6880,7 +6940,7 @@
     </p:spTree>
     <p:extLst>
       <p:ext uri="{BB962C8B-B14F-4D97-AF65-F5344CB8AC3E}">
-        <p14:creationId xmlns:p14="http://schemas.microsoft.com/office/powerpoint/2010/main" val="3202005553"/>
+        <p14:creationId xmlns:p14="http://schemas.microsoft.com/office/powerpoint/2010/main" val="1362572830"/>
       </p:ext>
     </p:extLst>
   </p:cSld>
@@ -6912,6 +6972,115 @@
           <p:cNvPr id="2" name="Title 1">
             <a:extLst>
               <a:ext uri="{FF2B5EF4-FFF2-40B4-BE49-F238E27FC236}">
+                <a16:creationId xmlns:a16="http://schemas.microsoft.com/office/drawing/2014/main" id="{95AE87BB-59C3-4A85-ACE0-D5ABC3E2BA2A}"/>
+              </a:ext>
+            </a:extLst>
+          </p:cNvPr>
+          <p:cNvSpPr>
+            <a:spLocks noGrp="1"/>
+          </p:cNvSpPr>
+          <p:nvPr>
+            <p:ph type="title"/>
+          </p:nvPr>
+        </p:nvSpPr>
+        <p:spPr/>
+        <p:txBody>
+          <a:bodyPr/>
+          <a:lstStyle/>
+          <a:p>
+            <a:pPr algn="ctr"/>
+            <a:r>
+              <a:rPr lang="en-IE" b="1" dirty="0"/>
+              <a:t>Known Issues</a:t>
+            </a:r>
+          </a:p>
+        </p:txBody>
+      </p:sp>
+      <p:sp>
+        <p:nvSpPr>
+          <p:cNvPr id="3" name="Content Placeholder 2">
+            <a:extLst>
+              <a:ext uri="{FF2B5EF4-FFF2-40B4-BE49-F238E27FC236}">
+                <a16:creationId xmlns:a16="http://schemas.microsoft.com/office/drawing/2014/main" id="{6B37D7EF-5033-4666-858D-E4841CABF5D6}"/>
+              </a:ext>
+            </a:extLst>
+          </p:cNvPr>
+          <p:cNvSpPr>
+            <a:spLocks noGrp="1"/>
+          </p:cNvSpPr>
+          <p:nvPr>
+            <p:ph idx="1"/>
+          </p:nvPr>
+        </p:nvSpPr>
+        <p:spPr/>
+        <p:txBody>
+          <a:bodyPr/>
+          <a:lstStyle/>
+          <a:p>
+            <a:r>
+              <a:rPr lang="en-IE" dirty="0"/>
+              <a:t>Graph does not display the way we want it to (pubnub graph)</a:t>
+            </a:r>
+          </a:p>
+          <a:p>
+            <a:r>
+              <a:rPr lang="en-IE" dirty="0"/>
+              <a:t>Website needs apache2 restart every few hours or it breaks and you cant login.</a:t>
+            </a:r>
+          </a:p>
+          <a:p>
+            <a:r>
+              <a:rPr lang="en-US" dirty="0"/>
+              <a:t>Height can only be measured if sensor is faced directly at the ground</a:t>
+            </a:r>
+            <a:endParaRPr lang="en-IE" dirty="0"/>
+          </a:p>
+          <a:p>
+            <a:endParaRPr lang="en-IE" dirty="0"/>
+          </a:p>
+          <a:p>
+            <a:endParaRPr lang="en-IE" dirty="0"/>
+          </a:p>
+          <a:p>
+            <a:endParaRPr lang="en-IE" dirty="0"/>
+          </a:p>
+        </p:txBody>
+      </p:sp>
+    </p:spTree>
+    <p:extLst>
+      <p:ext uri="{BB962C8B-B14F-4D97-AF65-F5344CB8AC3E}">
+        <p14:creationId xmlns:p14="http://schemas.microsoft.com/office/powerpoint/2010/main" val="3202005553"/>
+      </p:ext>
+    </p:extLst>
+  </p:cSld>
+  <p:clrMapOvr>
+    <a:masterClrMapping/>
+  </p:clrMapOvr>
+</p:sld>
+</file>
+
+<file path=ppt/slides/slide6.xml><?xml version="1.0" encoding="utf-8"?>
+<p:sld xmlns:a="http://schemas.openxmlformats.org/drawingml/2006/main" xmlns:r="http://schemas.openxmlformats.org/officeDocument/2006/relationships" xmlns:p="http://schemas.openxmlformats.org/presentationml/2006/main">
+  <p:cSld>
+    <p:spTree>
+      <p:nvGrpSpPr>
+        <p:cNvPr id="1" name=""/>
+        <p:cNvGrpSpPr/>
+        <p:nvPr/>
+      </p:nvGrpSpPr>
+      <p:grpSpPr>
+        <a:xfrm>
+          <a:off x="0" y="0"/>
+          <a:ext cx="0" cy="0"/>
+          <a:chOff x="0" y="0"/>
+          <a:chExt cx="0" cy="0"/>
+        </a:xfrm>
+      </p:grpSpPr>
+      <p:sp>
+        <p:nvSpPr>
+          <p:cNvPr id="2" name="Title 1">
+            <a:extLst>
+              <a:ext uri="{FF2B5EF4-FFF2-40B4-BE49-F238E27FC236}">
                 <a16:creationId xmlns:a16="http://schemas.microsoft.com/office/drawing/2014/main" id="{E02ABFF7-1213-4F66-AAA0-B7CAEA0ED2FC}"/>
               </a:ext>
             </a:extLst>
@@ -7012,7 +7181,7 @@
 </p:sld>
 </file>
 
-<file path=ppt/slides/slide6.xml><?xml version="1.0" encoding="utf-8"?>
+<file path=ppt/slides/slide7.xml><?xml version="1.0" encoding="utf-8"?>
 <p:sld xmlns:a="http://schemas.openxmlformats.org/drawingml/2006/main" xmlns:r="http://schemas.openxmlformats.org/officeDocument/2006/relationships" xmlns:p="http://schemas.openxmlformats.org/presentationml/2006/main">
   <p:cSld>
     <p:spTree>

</xml_diff>